<commit_message>
pieceholder found proper use
</commit_message>
<xml_diff>
--- a/MEDIA/presentation.pptx
+++ b/MEDIA/presentation.pptx
@@ -12,10 +12,10 @@
     <p:sldId id="260" r:id="rId6"/>
     <p:sldId id="261" r:id="rId7"/>
     <p:sldId id="259" r:id="rId8"/>
-    <p:sldId id="262" r:id="rId9"/>
-    <p:sldId id="263" r:id="rId10"/>
-    <p:sldId id="267" r:id="rId11"/>
-    <p:sldId id="265" r:id="rId12"/>
+    <p:sldId id="265" r:id="rId9"/>
+    <p:sldId id="262" r:id="rId10"/>
+    <p:sldId id="263" r:id="rId11"/>
+    <p:sldId id="267" r:id="rId12"/>
     <p:sldId id="268" r:id="rId13"/>
   </p:sldIdLst>
   <p:sldSz cx="12192000" cy="6858000"/>
@@ -3155,12 +3155,8 @@
           <a:lstStyle/>
           <a:p>
             <a:r>
-              <a:rPr lang="en-IN" dirty="0"/>
-              <a:t>distance_formula(pos1, pos2</a:t>
-            </a:r>
-            <a:r>
               <a:rPr lang="en-IN" dirty="0" smtClean="0"/>
-              <a:t>) – calculate distance between two 						    points on the board</a:t>
+              <a:t>game() – the actual game loop</a:t>
             </a:r>
           </a:p>
           <a:p>
@@ -3170,6 +3166,12 @@
             <a:endParaRPr lang="en-IN" dirty="0" smtClean="0"/>
           </a:p>
           <a:p>
+            <a:r>
+              <a:rPr lang="en-IN" dirty="0" smtClean="0"/>
+              <a:t>drawboard(colors) – draws the chess board</a:t>
+            </a:r>
+          </a:p>
+          <a:p>
             <a:pPr marL="0" indent="0">
               <a:buNone/>
             </a:pPr>
@@ -3178,37 +3180,10 @@
           <a:p>
             <a:r>
               <a:rPr lang="en-IN" dirty="0" smtClean="0"/>
-              <a:t>isfarther(start</a:t>
-            </a:r>
-            <a:r>
-              <a:rPr lang="en-IN" dirty="0"/>
-              <a:t>, pos1, pos2</a:t>
-            </a:r>
-            <a:r>
-              <a:rPr lang="en-IN" dirty="0" smtClean="0"/>
-              <a:t>) – get the point farthest from start</a:t>
-            </a:r>
-            <a:endParaRPr lang="en-IN" dirty="0"/>
-          </a:p>
-          <a:p>
-            <a:endParaRPr lang="en-IN" dirty="0" smtClean="0"/>
-          </a:p>
-          <a:p>
-            <a:endParaRPr lang="en-IN" dirty="0" smtClean="0"/>
-          </a:p>
-          <a:p>
-            <a:r>
-              <a:rPr lang="en-IN" dirty="0" smtClean="0"/>
-              <a:t>nearest_piece(position</a:t>
-            </a:r>
-            <a:r>
-              <a:rPr lang="en-IN" dirty="0"/>
-              <a:t>, </a:t>
-            </a:r>
-            <a:r>
-              <a:rPr lang="en-IN" dirty="0" smtClean="0"/>
-              <a:t>listofPieces) – calculate nearest piece from a 						   given point</a:t>
-            </a:r>
+              <a:t>make_lines(position, position list, angle list) – find squares at a particular angle from given position</a:t>
+            </a:r>
+          </a:p>
+          <a:p>
             <a:endParaRPr lang="en-IN" dirty="0"/>
           </a:p>
         </p:txBody>
@@ -3216,7 +3191,7 @@
     </p:spTree>
     <p:extLst>
       <p:ext uri="{BB962C8B-B14F-4D97-AF65-F5344CB8AC3E}">
-        <p14:creationId xmlns:p14="http://schemas.microsoft.com/office/powerpoint/2010/main" val="1551318343"/>
+        <p14:creationId xmlns:p14="http://schemas.microsoft.com/office/powerpoint/2010/main" val="3511299518"/>
       </p:ext>
     </p:extLst>
   </p:cSld>
@@ -3250,40 +3225,113 @@
           <a:chExt cx="0" cy="0"/>
         </a:xfrm>
       </p:grpSpPr>
-      <p:pic>
-        <p:nvPicPr>
-          <p:cNvPr id="3" name="Picture 2"/>
-          <p:cNvPicPr>
-            <a:picLocks noChangeAspect="1"/>
-          </p:cNvPicPr>
-          <p:nvPr/>
-        </p:nvPicPr>
-        <p:blipFill>
-          <a:blip r:embed="rId2">
-            <a:extLst>
-              <a:ext uri="{28A0092B-C50C-407E-A947-70E740481C1C}">
-                <a14:useLocalDpi xmlns:a14="http://schemas.microsoft.com/office/drawing/2010/main" val="0"/>
-              </a:ext>
-            </a:extLst>
-          </a:blip>
-          <a:stretch>
-            <a:fillRect/>
-          </a:stretch>
-        </p:blipFill>
+      <p:sp>
+        <p:nvSpPr>
+          <p:cNvPr id="2" name="Title 1"/>
+          <p:cNvSpPr>
+            <a:spLocks noGrp="1"/>
+          </p:cNvSpPr>
+          <p:nvPr>
+            <p:ph type="title"/>
+          </p:nvPr>
+        </p:nvSpPr>
+        <p:spPr/>
+        <p:txBody>
+          <a:bodyPr/>
+          <a:lstStyle/>
+          <a:p>
+            <a:pPr algn="ctr"/>
+            <a:r>
+              <a:rPr lang="en-IN" dirty="0" smtClean="0"/>
+              <a:t>User-Defined Functions</a:t>
+            </a:r>
+            <a:endParaRPr lang="en-IN" dirty="0"/>
+          </a:p>
+        </p:txBody>
+      </p:sp>
+      <p:sp>
+        <p:nvSpPr>
+          <p:cNvPr id="3" name="Content Placeholder 2"/>
+          <p:cNvSpPr>
+            <a:spLocks noGrp="1"/>
+          </p:cNvSpPr>
+          <p:nvPr>
+            <p:ph idx="1"/>
+          </p:nvPr>
+        </p:nvSpPr>
         <p:spPr>
           <a:xfrm>
-            <a:off x="-13" y="0"/>
-            <a:ext cx="12192013" cy="6888575"/>
+            <a:off x="838200" y="1803400"/>
+            <a:ext cx="10515600" cy="4622800"/>
           </a:xfrm>
-          <a:prstGeom prst="rect">
-            <a:avLst/>
-          </a:prstGeom>
         </p:spPr>
-      </p:pic>
+        <p:txBody>
+          <a:bodyPr/>
+          <a:lstStyle/>
+          <a:p>
+            <a:r>
+              <a:rPr lang="en-IN" dirty="0"/>
+              <a:t>distance_formula(pos1, pos2</a:t>
+            </a:r>
+            <a:r>
+              <a:rPr lang="en-IN" dirty="0" smtClean="0"/>
+              <a:t>) – calculate distance between two 						    points on the board</a:t>
+            </a:r>
+          </a:p>
+          <a:p>
+            <a:pPr marL="0" indent="0">
+              <a:buNone/>
+            </a:pPr>
+            <a:endParaRPr lang="en-IN" dirty="0" smtClean="0"/>
+          </a:p>
+          <a:p>
+            <a:pPr marL="0" indent="0">
+              <a:buNone/>
+            </a:pPr>
+            <a:endParaRPr lang="en-IN" dirty="0" smtClean="0"/>
+          </a:p>
+          <a:p>
+            <a:r>
+              <a:rPr lang="en-IN" dirty="0" smtClean="0"/>
+              <a:t>isfarther(start</a:t>
+            </a:r>
+            <a:r>
+              <a:rPr lang="en-IN" dirty="0"/>
+              <a:t>, pos1, pos2</a:t>
+            </a:r>
+            <a:r>
+              <a:rPr lang="en-IN" dirty="0" smtClean="0"/>
+              <a:t>) – get the point farthest from start</a:t>
+            </a:r>
+            <a:endParaRPr lang="en-IN" dirty="0"/>
+          </a:p>
+          <a:p>
+            <a:endParaRPr lang="en-IN" dirty="0" smtClean="0"/>
+          </a:p>
+          <a:p>
+            <a:endParaRPr lang="en-IN" dirty="0" smtClean="0"/>
+          </a:p>
+          <a:p>
+            <a:r>
+              <a:rPr lang="en-IN" dirty="0" smtClean="0"/>
+              <a:t>nearest_piece(position</a:t>
+            </a:r>
+            <a:r>
+              <a:rPr lang="en-IN" dirty="0"/>
+              <a:t>, </a:t>
+            </a:r>
+            <a:r>
+              <a:rPr lang="en-IN" dirty="0" smtClean="0"/>
+              <a:t>listofPieces) – calculate nearest piece from a 						   given point</a:t>
+            </a:r>
+            <a:endParaRPr lang="en-IN" dirty="0"/>
+          </a:p>
+        </p:txBody>
+      </p:sp>
     </p:spTree>
     <p:extLst>
       <p:ext uri="{BB962C8B-B14F-4D97-AF65-F5344CB8AC3E}">
-        <p14:creationId xmlns:p14="http://schemas.microsoft.com/office/powerpoint/2010/main" val="2773863182"/>
+        <p14:creationId xmlns:p14="http://schemas.microsoft.com/office/powerpoint/2010/main" val="1551318343"/>
       </p:ext>
     </p:extLst>
   </p:cSld>
@@ -4482,210 +4530,40 @@
           <a:chExt cx="0" cy="0"/>
         </a:xfrm>
       </p:grpSpPr>
-      <p:sp>
-        <p:nvSpPr>
-          <p:cNvPr id="2" name="Title 1"/>
-          <p:cNvSpPr>
-            <a:spLocks noGrp="1"/>
-          </p:cNvSpPr>
-          <p:nvPr>
-            <p:ph type="title"/>
-          </p:nvPr>
-        </p:nvSpPr>
-        <p:spPr/>
-        <p:txBody>
-          <a:bodyPr/>
-          <a:lstStyle/>
-          <a:p>
-            <a:r>
-              <a:rPr lang="en-IN" dirty="0" smtClean="0"/>
-              <a:t>Library Functions Used</a:t>
-            </a:r>
-            <a:endParaRPr lang="en-IN" dirty="0"/>
-          </a:p>
-        </p:txBody>
-      </p:sp>
-      <p:sp>
-        <p:nvSpPr>
-          <p:cNvPr id="3" name="Content Placeholder 2"/>
-          <p:cNvSpPr>
-            <a:spLocks noGrp="1"/>
-          </p:cNvSpPr>
-          <p:nvPr>
-            <p:ph idx="1"/>
-          </p:nvPr>
-        </p:nvSpPr>
+      <p:pic>
+        <p:nvPicPr>
+          <p:cNvPr id="3" name="Picture 2"/>
+          <p:cNvPicPr>
+            <a:picLocks noChangeAspect="1"/>
+          </p:cNvPicPr>
+          <p:nvPr/>
+        </p:nvPicPr>
+        <p:blipFill>
+          <a:blip r:embed="rId2">
+            <a:extLst>
+              <a:ext uri="{28A0092B-C50C-407E-A947-70E740481C1C}">
+                <a14:useLocalDpi xmlns:a14="http://schemas.microsoft.com/office/drawing/2010/main" val="0"/>
+              </a:ext>
+            </a:extLst>
+          </a:blip>
+          <a:stretch>
+            <a:fillRect/>
+          </a:stretch>
+        </p:blipFill>
         <p:spPr>
           <a:xfrm>
-            <a:off x="838200" y="1371600"/>
-            <a:ext cx="10515600" cy="4805363"/>
+            <a:off x="-13" y="0"/>
+            <a:ext cx="12192013" cy="6888575"/>
           </a:xfrm>
+          <a:prstGeom prst="rect">
+            <a:avLst/>
+          </a:prstGeom>
         </p:spPr>
-        <p:txBody>
-          <a:bodyPr>
-            <a:normAutofit fontScale="85000" lnSpcReduction="20000"/>
-          </a:bodyPr>
-          <a:lstStyle/>
-          <a:p>
-            <a:endParaRPr lang="en-IN" sz="2000" dirty="0" smtClean="0"/>
-          </a:p>
-          <a:p>
-            <a:r>
-              <a:rPr lang="en-IN" sz="2000" dirty="0" err="1" smtClean="0"/>
-              <a:t>p</a:t>
-            </a:r>
-            <a:r>
-              <a:rPr lang="en-IN" sz="2000" dirty="0" err="1" smtClean="0"/>
-              <a:t>ygame.Sprite</a:t>
-            </a:r>
-            <a:r>
-              <a:rPr lang="en-IN" sz="2000" dirty="0" smtClean="0"/>
-              <a:t>() – Basic game object (draw, drag and update functions available)</a:t>
-            </a:r>
-          </a:p>
-          <a:p>
-            <a:pPr lvl="1"/>
-            <a:r>
-              <a:rPr lang="en-IN" sz="1600" dirty="0" smtClean="0"/>
-              <a:t>d</a:t>
-            </a:r>
-            <a:r>
-              <a:rPr lang="en-IN" sz="1600" dirty="0" smtClean="0"/>
-              <a:t>raw()</a:t>
-            </a:r>
-          </a:p>
-          <a:p>
-            <a:pPr lvl="1"/>
-            <a:r>
-              <a:rPr lang="en-IN" sz="1600" dirty="0" smtClean="0"/>
-              <a:t>drag()</a:t>
-            </a:r>
-          </a:p>
-          <a:p>
-            <a:pPr lvl="1"/>
-            <a:r>
-              <a:rPr lang="en-IN" sz="1600" dirty="0" smtClean="0"/>
-              <a:t>update()</a:t>
-            </a:r>
-            <a:endParaRPr lang="en-IN" sz="1600" dirty="0" smtClean="0"/>
-          </a:p>
-          <a:p>
-            <a:pPr lvl="1"/>
-            <a:endParaRPr lang="en-IN" sz="1600" dirty="0" smtClean="0"/>
-          </a:p>
-          <a:p>
-            <a:r>
-              <a:rPr lang="en-IN" sz="2000" dirty="0" err="1"/>
-              <a:t>p</a:t>
-            </a:r>
-            <a:r>
-              <a:rPr lang="en-IN" sz="2000" dirty="0" err="1" smtClean="0"/>
-              <a:t>ygame.locals</a:t>
-            </a:r>
-            <a:endParaRPr lang="en-IN" sz="2000" dirty="0" smtClean="0"/>
-          </a:p>
-          <a:p>
-            <a:pPr lvl="1"/>
-            <a:r>
-              <a:rPr lang="en-IN" sz="1600" dirty="0" smtClean="0"/>
-              <a:t>MOUSEBUTTONDOWN</a:t>
-            </a:r>
-          </a:p>
-          <a:p>
-            <a:pPr lvl="1"/>
-            <a:r>
-              <a:rPr lang="en-IN" sz="1600" dirty="0" smtClean="0"/>
-              <a:t>MOUSEBUTTONUP</a:t>
-            </a:r>
-          </a:p>
-          <a:p>
-            <a:pPr lvl="1"/>
-            <a:r>
-              <a:rPr lang="en-IN" sz="1600" dirty="0" err="1" smtClean="0"/>
-              <a:t>Rect</a:t>
-            </a:r>
-            <a:endParaRPr lang="en-IN" sz="1600" dirty="0" smtClean="0"/>
-          </a:p>
-          <a:p>
-            <a:r>
-              <a:rPr lang="en-IN" sz="2000" dirty="0" err="1" smtClean="0"/>
-              <a:t>pygame.draw.rect</a:t>
-            </a:r>
-            <a:r>
-              <a:rPr lang="en-IN" sz="2000" dirty="0" smtClean="0"/>
-              <a:t>()</a:t>
-            </a:r>
-          </a:p>
-          <a:p>
-            <a:r>
-              <a:rPr lang="en-IN" sz="2000" dirty="0" err="1" smtClean="0"/>
-              <a:t>sys.exit</a:t>
-            </a:r>
-            <a:r>
-              <a:rPr lang="en-IN" sz="2000" dirty="0" smtClean="0"/>
-              <a:t>()</a:t>
-            </a:r>
-          </a:p>
-          <a:p>
-            <a:r>
-              <a:rPr lang="en-IN" sz="2000" dirty="0" err="1" smtClean="0"/>
-              <a:t>Tkinter.messagebox.showinfo</a:t>
-            </a:r>
-            <a:r>
-              <a:rPr lang="en-IN" sz="2000" dirty="0" smtClean="0"/>
-              <a:t>()</a:t>
-            </a:r>
-          </a:p>
-          <a:p>
-            <a:r>
-              <a:rPr lang="en-IN" sz="2000" dirty="0" err="1" smtClean="0"/>
-              <a:t>pygame.display.set_caption</a:t>
-            </a:r>
-            <a:r>
-              <a:rPr lang="en-IN" sz="2000" dirty="0" smtClean="0"/>
-              <a:t>()</a:t>
-            </a:r>
-          </a:p>
-          <a:p>
-            <a:r>
-              <a:rPr lang="en-IN" sz="2000" dirty="0" smtClean="0"/>
-              <a:t>math</a:t>
-            </a:r>
-          </a:p>
-          <a:p>
-            <a:pPr lvl="1"/>
-            <a:r>
-              <a:rPr lang="en-IN" sz="1600" dirty="0" smtClean="0"/>
-              <a:t>pi()</a:t>
-            </a:r>
-          </a:p>
-          <a:p>
-            <a:pPr lvl="1"/>
-            <a:r>
-              <a:rPr lang="en-IN" sz="1600" dirty="0" err="1" smtClean="0"/>
-              <a:t>sqrt</a:t>
-            </a:r>
-            <a:r>
-              <a:rPr lang="en-IN" sz="1600" dirty="0" smtClean="0"/>
-              <a:t>()</a:t>
-            </a:r>
-          </a:p>
-          <a:p>
-            <a:pPr lvl="1"/>
-            <a:r>
-              <a:rPr lang="en-IN" sz="1600" dirty="0" smtClean="0"/>
-              <a:t>atan2()</a:t>
-            </a:r>
-          </a:p>
-          <a:p>
-            <a:endParaRPr lang="en-IN" dirty="0"/>
-          </a:p>
-        </p:txBody>
-      </p:sp>
+      </p:pic>
     </p:spTree>
     <p:extLst>
       <p:ext uri="{BB962C8B-B14F-4D97-AF65-F5344CB8AC3E}">
-        <p14:creationId xmlns:p14="http://schemas.microsoft.com/office/powerpoint/2010/main" val="2586307560"/>
+        <p14:creationId xmlns:p14="http://schemas.microsoft.com/office/powerpoint/2010/main" val="2773863182"/>
       </p:ext>
     </p:extLst>
   </p:cSld>
@@ -4734,10 +4612,9 @@
           <a:bodyPr/>
           <a:lstStyle/>
           <a:p>
-            <a:pPr algn="ctr"/>
             <a:r>
               <a:rPr lang="en-IN" dirty="0" smtClean="0"/>
-              <a:t>User-Defined Functions</a:t>
+              <a:t>Library Functions Used</a:t>
             </a:r>
             <a:endParaRPr lang="en-IN" dirty="0"/>
           </a:p>
@@ -4755,41 +4632,155 @@
         </p:nvSpPr>
         <p:spPr>
           <a:xfrm>
-            <a:off x="838200" y="1803400"/>
-            <a:ext cx="10515600" cy="4622800"/>
+            <a:off x="838200" y="1371600"/>
+            <a:ext cx="10515600" cy="4805363"/>
           </a:xfrm>
         </p:spPr>
         <p:txBody>
-          <a:bodyPr/>
-          <a:lstStyle/>
-          <a:p>
-            <a:r>
-              <a:rPr lang="en-IN" dirty="0" smtClean="0"/>
-              <a:t>game() – the actual game loop</a:t>
-            </a:r>
-          </a:p>
-          <a:p>
-            <a:pPr marL="0" indent="0">
-              <a:buNone/>
-            </a:pPr>
-            <a:endParaRPr lang="en-IN" dirty="0" smtClean="0"/>
-          </a:p>
-          <a:p>
-            <a:r>
-              <a:rPr lang="en-IN" dirty="0" smtClean="0"/>
-              <a:t>drawboard(colors) – draws the chess board</a:t>
-            </a:r>
-          </a:p>
-          <a:p>
-            <a:pPr marL="0" indent="0">
-              <a:buNone/>
-            </a:pPr>
-            <a:endParaRPr lang="en-IN" dirty="0" smtClean="0"/>
-          </a:p>
-          <a:p>
-            <a:r>
-              <a:rPr lang="en-IN" dirty="0" smtClean="0"/>
-              <a:t>make_lines(position, position list, angle list) – find squares at a particular angle from given position</a:t>
+          <a:bodyPr>
+            <a:normAutofit fontScale="85000" lnSpcReduction="20000"/>
+          </a:bodyPr>
+          <a:lstStyle/>
+          <a:p>
+            <a:endParaRPr lang="en-IN" sz="2000" dirty="0" smtClean="0"/>
+          </a:p>
+          <a:p>
+            <a:r>
+              <a:rPr lang="en-IN" sz="2000" dirty="0" err="1" smtClean="0"/>
+              <a:t>pygame.Sprite</a:t>
+            </a:r>
+            <a:r>
+              <a:rPr lang="en-IN" sz="2000" dirty="0" smtClean="0"/>
+              <a:t>() – Basic game object (draw, drag and update functions available)</a:t>
+            </a:r>
+          </a:p>
+          <a:p>
+            <a:pPr lvl="1"/>
+            <a:r>
+              <a:rPr lang="en-IN" sz="1600" dirty="0" smtClean="0"/>
+              <a:t>draw()</a:t>
+            </a:r>
+          </a:p>
+          <a:p>
+            <a:pPr lvl="1"/>
+            <a:r>
+              <a:rPr lang="en-IN" sz="1600" dirty="0" smtClean="0"/>
+              <a:t>drag()</a:t>
+            </a:r>
+          </a:p>
+          <a:p>
+            <a:pPr lvl="1"/>
+            <a:r>
+              <a:rPr lang="en-IN" sz="1600" dirty="0" smtClean="0"/>
+              <a:t>update()</a:t>
+            </a:r>
+          </a:p>
+          <a:p>
+            <a:pPr lvl="1"/>
+            <a:endParaRPr lang="en-IN" sz="1600" dirty="0" smtClean="0"/>
+          </a:p>
+          <a:p>
+            <a:r>
+              <a:rPr lang="en-IN" sz="2000" dirty="0" err="1"/>
+              <a:t>p</a:t>
+            </a:r>
+            <a:r>
+              <a:rPr lang="en-IN" sz="2000" dirty="0" err="1" smtClean="0"/>
+              <a:t>ygame.locals</a:t>
+            </a:r>
+            <a:endParaRPr lang="en-IN" sz="2000" dirty="0" smtClean="0"/>
+          </a:p>
+          <a:p>
+            <a:pPr lvl="1"/>
+            <a:r>
+              <a:rPr lang="en-IN" sz="1600" dirty="0" smtClean="0"/>
+              <a:t>MOUSEBUTTONDOWN</a:t>
+            </a:r>
+          </a:p>
+          <a:p>
+            <a:pPr lvl="1"/>
+            <a:r>
+              <a:rPr lang="en-IN" sz="1600" dirty="0" smtClean="0"/>
+              <a:t>MOUSEBUTTONUP</a:t>
+            </a:r>
+          </a:p>
+          <a:p>
+            <a:pPr lvl="1"/>
+            <a:r>
+              <a:rPr lang="en-IN" sz="1600" dirty="0" err="1" smtClean="0"/>
+              <a:t>Rect</a:t>
+            </a:r>
+            <a:endParaRPr lang="en-IN" sz="1600" dirty="0" smtClean="0"/>
+          </a:p>
+          <a:p>
+            <a:r>
+              <a:rPr lang="en-IN" sz="2000" dirty="0" err="1" smtClean="0"/>
+              <a:t>pygame.draw.rect</a:t>
+            </a:r>
+            <a:r>
+              <a:rPr lang="en-IN" sz="2000" dirty="0" smtClean="0"/>
+              <a:t>()</a:t>
+            </a:r>
+          </a:p>
+          <a:p>
+            <a:r>
+              <a:rPr lang="en-IN" sz="2000" dirty="0" err="1" smtClean="0"/>
+              <a:t>sys.exit</a:t>
+            </a:r>
+            <a:r>
+              <a:rPr lang="en-IN" sz="2000" dirty="0" smtClean="0"/>
+              <a:t>()</a:t>
+            </a:r>
+          </a:p>
+          <a:p>
+            <a:r>
+              <a:rPr lang="en-IN" sz="2000" dirty="0" err="1" smtClean="0"/>
+              <a:t>Tkinter.messagebox.showinfo</a:t>
+            </a:r>
+            <a:r>
+              <a:rPr lang="en-IN" sz="2000" dirty="0" smtClean="0"/>
+              <a:t>()</a:t>
+            </a:r>
+          </a:p>
+          <a:p>
+            <a:r>
+              <a:rPr lang="en-IN" sz="2000" dirty="0" err="1" smtClean="0"/>
+              <a:t>pygame.display.set_caption</a:t>
+            </a:r>
+            <a:r>
+              <a:rPr lang="en-IN" sz="2000" dirty="0" smtClean="0"/>
+              <a:t>()</a:t>
+            </a:r>
+          </a:p>
+          <a:p>
+            <a:r>
+              <a:rPr lang="en-IN" sz="2000" dirty="0" smtClean="0"/>
+              <a:t>math</a:t>
+            </a:r>
+          </a:p>
+          <a:p>
+            <a:pPr lvl="1"/>
+            <a:r>
+              <a:rPr lang="en-IN" sz="1600" dirty="0" smtClean="0"/>
+              <a:t>pi()</a:t>
+            </a:r>
+          </a:p>
+          <a:p>
+            <a:pPr lvl="1"/>
+            <a:r>
+              <a:rPr lang="en-IN" sz="1600" dirty="0" err="1" smtClean="0"/>
+              <a:t>sqrt</a:t>
+            </a:r>
+            <a:r>
+              <a:rPr lang="en-IN" sz="1600" dirty="0" smtClean="0"/>
+              <a:t>()</a:t>
+            </a:r>
+          </a:p>
+          <a:p>
+            <a:pPr lvl="1"/>
+            <a:r>
+              <a:rPr lang="en-IN" sz="1600" dirty="0" smtClean="0"/>
+              <a:t>atan2()</a:t>
             </a:r>
           </a:p>
           <a:p>
@@ -4800,7 +4791,7 @@
     </p:spTree>
     <p:extLst>
       <p:ext uri="{BB962C8B-B14F-4D97-AF65-F5344CB8AC3E}">
-        <p14:creationId xmlns:p14="http://schemas.microsoft.com/office/powerpoint/2010/main" val="3511299518"/>
+        <p14:creationId xmlns:p14="http://schemas.microsoft.com/office/powerpoint/2010/main" val="2586307560"/>
       </p:ext>
     </p:extLst>
   </p:cSld>

</xml_diff>